<commit_message>
finally found the bug
</commit_message>
<xml_diff>
--- a/新建 Microsoft PowerPoint 演示文稿.pptx
+++ b/新建 Microsoft PowerPoint 演示文稿.pptx
@@ -6,6 +6,7 @@
   </p:sldMasterIdLst>
   <p:sldIdLst>
     <p:sldId id="256" r:id="rId2"/>
+    <p:sldId id="257" r:id="rId3"/>
   </p:sldIdLst>
   <p:sldSz cx="12192000" cy="6858000"/>
   <p:notesSz cx="6858000" cy="9144000"/>
@@ -104,6 +105,11 @@
       </a:defRPr>
     </a:lvl9pPr>
   </p:defaultTextStyle>
+  <p:extLst>
+    <p:ext uri="{EFAFB233-063F-42B5-8137-9DF3F51BA10A}">
+      <p15:sldGuideLst xmlns:p15="http://schemas.microsoft.com/office/powerpoint/2012/main"/>
+    </p:ext>
+  </p:extLst>
 </p:presentation>
 </file>
 
@@ -254,7 +260,7 @@
           <a:p>
             <a:fld id="{5B2FF438-1605-490B-B5FF-35EA039D99F9}" type="datetimeFigureOut">
               <a:rPr lang="zh-CN" altLang="en-US" smtClean="0"/>
-              <a:t>2024/7/7</a:t>
+              <a:t>2024/7/9</a:t>
             </a:fld>
             <a:endParaRPr lang="zh-CN" altLang="en-US"/>
           </a:p>
@@ -452,7 +458,7 @@
           <a:p>
             <a:fld id="{5B2FF438-1605-490B-B5FF-35EA039D99F9}" type="datetimeFigureOut">
               <a:rPr lang="zh-CN" altLang="en-US" smtClean="0"/>
-              <a:t>2024/7/7</a:t>
+              <a:t>2024/7/9</a:t>
             </a:fld>
             <a:endParaRPr lang="zh-CN" altLang="en-US"/>
           </a:p>
@@ -660,7 +666,7 @@
           <a:p>
             <a:fld id="{5B2FF438-1605-490B-B5FF-35EA039D99F9}" type="datetimeFigureOut">
               <a:rPr lang="zh-CN" altLang="en-US" smtClean="0"/>
-              <a:t>2024/7/7</a:t>
+              <a:t>2024/7/9</a:t>
             </a:fld>
             <a:endParaRPr lang="zh-CN" altLang="en-US"/>
           </a:p>
@@ -858,7 +864,7 @@
           <a:p>
             <a:fld id="{5B2FF438-1605-490B-B5FF-35EA039D99F9}" type="datetimeFigureOut">
               <a:rPr lang="zh-CN" altLang="en-US" smtClean="0"/>
-              <a:t>2024/7/7</a:t>
+              <a:t>2024/7/9</a:t>
             </a:fld>
             <a:endParaRPr lang="zh-CN" altLang="en-US"/>
           </a:p>
@@ -1133,7 +1139,7 @@
           <a:p>
             <a:fld id="{5B2FF438-1605-490B-B5FF-35EA039D99F9}" type="datetimeFigureOut">
               <a:rPr lang="zh-CN" altLang="en-US" smtClean="0"/>
-              <a:t>2024/7/7</a:t>
+              <a:t>2024/7/9</a:t>
             </a:fld>
             <a:endParaRPr lang="zh-CN" altLang="en-US"/>
           </a:p>
@@ -1398,7 +1404,7 @@
           <a:p>
             <a:fld id="{5B2FF438-1605-490B-B5FF-35EA039D99F9}" type="datetimeFigureOut">
               <a:rPr lang="zh-CN" altLang="en-US" smtClean="0"/>
-              <a:t>2024/7/7</a:t>
+              <a:t>2024/7/9</a:t>
             </a:fld>
             <a:endParaRPr lang="zh-CN" altLang="en-US"/>
           </a:p>
@@ -1810,7 +1816,7 @@
           <a:p>
             <a:fld id="{5B2FF438-1605-490B-B5FF-35EA039D99F9}" type="datetimeFigureOut">
               <a:rPr lang="zh-CN" altLang="en-US" smtClean="0"/>
-              <a:t>2024/7/7</a:t>
+              <a:t>2024/7/9</a:t>
             </a:fld>
             <a:endParaRPr lang="zh-CN" altLang="en-US"/>
           </a:p>
@@ -1951,7 +1957,7 @@
           <a:p>
             <a:fld id="{5B2FF438-1605-490B-B5FF-35EA039D99F9}" type="datetimeFigureOut">
               <a:rPr lang="zh-CN" altLang="en-US" smtClean="0"/>
-              <a:t>2024/7/7</a:t>
+              <a:t>2024/7/9</a:t>
             </a:fld>
             <a:endParaRPr lang="zh-CN" altLang="en-US"/>
           </a:p>
@@ -2064,7 +2070,7 @@
           <a:p>
             <a:fld id="{5B2FF438-1605-490B-B5FF-35EA039D99F9}" type="datetimeFigureOut">
               <a:rPr lang="zh-CN" altLang="en-US" smtClean="0"/>
-              <a:t>2024/7/7</a:t>
+              <a:t>2024/7/9</a:t>
             </a:fld>
             <a:endParaRPr lang="zh-CN" altLang="en-US"/>
           </a:p>
@@ -2375,7 +2381,7 @@
           <a:p>
             <a:fld id="{5B2FF438-1605-490B-B5FF-35EA039D99F9}" type="datetimeFigureOut">
               <a:rPr lang="zh-CN" altLang="en-US" smtClean="0"/>
-              <a:t>2024/7/7</a:t>
+              <a:t>2024/7/9</a:t>
             </a:fld>
             <a:endParaRPr lang="zh-CN" altLang="en-US"/>
           </a:p>
@@ -2663,7 +2669,7 @@
           <a:p>
             <a:fld id="{5B2FF438-1605-490B-B5FF-35EA039D99F9}" type="datetimeFigureOut">
               <a:rPr lang="zh-CN" altLang="en-US" smtClean="0"/>
-              <a:t>2024/7/7</a:t>
+              <a:t>2024/7/9</a:t>
             </a:fld>
             <a:endParaRPr lang="zh-CN" altLang="en-US"/>
           </a:p>
@@ -2904,7 +2910,7 @@
           <a:p>
             <a:fld id="{5B2FF438-1605-490B-B5FF-35EA039D99F9}" type="datetimeFigureOut">
               <a:rPr lang="zh-CN" altLang="en-US" smtClean="0"/>
-              <a:t>2024/7/7</a:t>
+              <a:t>2024/7/9</a:t>
             </a:fld>
             <a:endParaRPr lang="zh-CN" altLang="en-US"/>
           </a:p>
@@ -3321,12 +3327,150 @@
           <a:chExt cx="0" cy="0"/>
         </a:xfrm>
       </p:grpSpPr>
+      <p:pic>
+        <p:nvPicPr>
+          <p:cNvPr id="5" name="图片 4">
+            <a:extLst>
+              <a:ext uri="{FF2B5EF4-FFF2-40B4-BE49-F238E27FC236}">
+                <a16:creationId xmlns:a16="http://schemas.microsoft.com/office/drawing/2014/main" id="{D08EEF6F-EC9E-32BA-9F43-D80C6C91A6A6}"/>
+              </a:ext>
+            </a:extLst>
+          </p:cNvPr>
+          <p:cNvPicPr>
+            <a:picLocks noChangeAspect="1"/>
+          </p:cNvPicPr>
+          <p:nvPr/>
+        </p:nvPicPr>
+        <p:blipFill>
+          <a:blip r:embed="rId2">
+            <a:extLst>
+              <a:ext uri="{28A0092B-C50C-407E-A947-70E740481C1C}">
+                <a14:useLocalDpi xmlns:a14="http://schemas.microsoft.com/office/drawing/2010/main" val="0"/>
+              </a:ext>
+            </a:extLst>
+          </a:blip>
+          <a:stretch>
+            <a:fillRect/>
+          </a:stretch>
+        </p:blipFill>
+        <p:spPr>
+          <a:xfrm>
+            <a:off x="2611827" y="3272461"/>
+            <a:ext cx="3484173" cy="3580818"/>
+          </a:xfrm>
+          <a:prstGeom prst="rect">
+            <a:avLst/>
+          </a:prstGeom>
+        </p:spPr>
+      </p:pic>
+      <p:pic>
+        <p:nvPicPr>
+          <p:cNvPr id="7" name="图片 6">
+            <a:extLst>
+              <a:ext uri="{FF2B5EF4-FFF2-40B4-BE49-F238E27FC236}">
+                <a16:creationId xmlns:a16="http://schemas.microsoft.com/office/drawing/2014/main" id="{97BF2D19-E2CA-C4F7-DD87-F088A271ED33}"/>
+              </a:ext>
+            </a:extLst>
+          </p:cNvPr>
+          <p:cNvPicPr>
+            <a:picLocks noChangeAspect="1"/>
+          </p:cNvPicPr>
+          <p:nvPr/>
+        </p:nvPicPr>
+        <p:blipFill>
+          <a:blip r:embed="rId3">
+            <a:extLst>
+              <a:ext uri="{28A0092B-C50C-407E-A947-70E740481C1C}">
+                <a14:useLocalDpi xmlns:a14="http://schemas.microsoft.com/office/drawing/2010/main" val="0"/>
+              </a:ext>
+            </a:extLst>
+          </a:blip>
+          <a:stretch>
+            <a:fillRect/>
+          </a:stretch>
+        </p:blipFill>
+        <p:spPr>
+          <a:xfrm>
+            <a:off x="2793001" y="4721"/>
+            <a:ext cx="6605998" cy="3300798"/>
+          </a:xfrm>
+          <a:prstGeom prst="rect">
+            <a:avLst/>
+          </a:prstGeom>
+        </p:spPr>
+      </p:pic>
+      <p:pic>
+        <p:nvPicPr>
+          <p:cNvPr id="11" name="图片 10">
+            <a:extLst>
+              <a:ext uri="{FF2B5EF4-FFF2-40B4-BE49-F238E27FC236}">
+                <a16:creationId xmlns:a16="http://schemas.microsoft.com/office/drawing/2014/main" id="{85BF5928-03DD-B8FE-F8FD-D4FB22A297EF}"/>
+              </a:ext>
+            </a:extLst>
+          </p:cNvPr>
+          <p:cNvPicPr>
+            <a:picLocks noChangeAspect="1"/>
+          </p:cNvPicPr>
+          <p:nvPr/>
+        </p:nvPicPr>
+        <p:blipFill>
+          <a:blip r:embed="rId4">
+            <a:extLst>
+              <a:ext uri="{28A0092B-C50C-407E-A947-70E740481C1C}">
+                <a14:useLocalDpi xmlns:a14="http://schemas.microsoft.com/office/drawing/2010/main" val="0"/>
+              </a:ext>
+            </a:extLst>
+          </a:blip>
+          <a:stretch>
+            <a:fillRect/>
+          </a:stretch>
+        </p:blipFill>
+        <p:spPr>
+          <a:xfrm>
+            <a:off x="6017156" y="3305518"/>
+            <a:ext cx="4231632" cy="3552481"/>
+          </a:xfrm>
+          <a:prstGeom prst="rect">
+            <a:avLst/>
+          </a:prstGeom>
+        </p:spPr>
+      </p:pic>
+    </p:spTree>
+    <p:extLst>
+      <p:ext uri="{BB962C8B-B14F-4D97-AF65-F5344CB8AC3E}">
+        <p14:creationId xmlns:p14="http://schemas.microsoft.com/office/powerpoint/2010/main" val="512396915"/>
+      </p:ext>
+    </p:extLst>
+  </p:cSld>
+  <p:clrMapOvr>
+    <a:masterClrMapping/>
+  </p:clrMapOvr>
+</p:sld>
+</file>
+
+<file path=ppt/slides/slide2.xml><?xml version="1.0" encoding="utf-8"?>
+<p:sld xmlns:a="http://schemas.openxmlformats.org/drawingml/2006/main" xmlns:r="http://schemas.openxmlformats.org/officeDocument/2006/relationships" xmlns:p="http://schemas.openxmlformats.org/presentationml/2006/main">
+  <p:cSld>
+    <p:spTree>
+      <p:nvGrpSpPr>
+        <p:cNvPr id="1" name=""/>
+        <p:cNvGrpSpPr/>
+        <p:nvPr/>
+      </p:nvGrpSpPr>
+      <p:grpSpPr>
+        <a:xfrm>
+          <a:off x="0" y="0"/>
+          <a:ext cx="0" cy="0"/>
+          <a:chOff x="0" y="0"/>
+          <a:chExt cx="0" cy="0"/>
+        </a:xfrm>
+      </p:grpSpPr>
       <p:grpSp>
         <p:nvGrpSpPr>
           <p:cNvPr id="12" name="组合 11">
             <a:extLst>
               <a:ext uri="{FF2B5EF4-FFF2-40B4-BE49-F238E27FC236}">
-                <a16:creationId xmlns:a16="http://schemas.microsoft.com/office/drawing/2014/main" id="{B4C84E6E-4354-8B5D-9163-0FA5FC3F5883}"/>
+                <a16:creationId xmlns:a16="http://schemas.microsoft.com/office/drawing/2014/main" id="{A9F33062-EE1C-43E8-3282-BB9A3113CA80}"/>
               </a:ext>
             </a:extLst>
           </p:cNvPr>
@@ -3335,18 +3479,18 @@
         </p:nvGrpSpPr>
         <p:grpSpPr>
           <a:xfrm>
-            <a:off x="2611827" y="4721"/>
-            <a:ext cx="7636961" cy="6853278"/>
-            <a:chOff x="2611827" y="4721"/>
-            <a:chExt cx="7636961" cy="6853278"/>
+            <a:off x="2804613" y="-4929"/>
+            <a:ext cx="7444175" cy="6862928"/>
+            <a:chOff x="2804613" y="-4929"/>
+            <a:chExt cx="7444175" cy="6862928"/>
           </a:xfrm>
         </p:grpSpPr>
         <p:pic>
           <p:nvPicPr>
-            <p:cNvPr id="5" name="图片 4">
+            <p:cNvPr id="11" name="图片 10">
               <a:extLst>
                 <a:ext uri="{FF2B5EF4-FFF2-40B4-BE49-F238E27FC236}">
-                  <a16:creationId xmlns:a16="http://schemas.microsoft.com/office/drawing/2014/main" id="{D08EEF6F-EC9E-32BA-9F43-D80C6C91A6A6}"/>
+                  <a16:creationId xmlns:a16="http://schemas.microsoft.com/office/drawing/2014/main" id="{85BF5928-03DD-B8FE-F8FD-D4FB22A297EF}"/>
                 </a:ext>
               </a:extLst>
             </p:cNvPr>
@@ -3369,8 +3513,8 @@
           </p:blipFill>
           <p:spPr>
             <a:xfrm>
-              <a:off x="2611827" y="3272461"/>
-              <a:ext cx="3484173" cy="3580818"/>
+              <a:off x="6017156" y="3305518"/>
+              <a:ext cx="4231632" cy="3552481"/>
             </a:xfrm>
             <a:prstGeom prst="rect">
               <a:avLst/>
@@ -3379,10 +3523,10 @@
         </p:pic>
         <p:pic>
           <p:nvPicPr>
-            <p:cNvPr id="7" name="图片 6">
+            <p:cNvPr id="6" name="图片 5">
               <a:extLst>
                 <a:ext uri="{FF2B5EF4-FFF2-40B4-BE49-F238E27FC236}">
-                  <a16:creationId xmlns:a16="http://schemas.microsoft.com/office/drawing/2014/main" id="{97BF2D19-E2CA-C4F7-DD87-F088A271ED33}"/>
+                  <a16:creationId xmlns:a16="http://schemas.microsoft.com/office/drawing/2014/main" id="{57EB3650-1F74-4D4C-F0D9-192AF736BA58}"/>
                 </a:ext>
               </a:extLst>
             </p:cNvPr>
@@ -3405,8 +3549,8 @@
           </p:blipFill>
           <p:spPr>
             <a:xfrm>
-              <a:off x="2793001" y="4721"/>
-              <a:ext cx="6605998" cy="3300798"/>
+              <a:off x="2804613" y="3288988"/>
+              <a:ext cx="3415009" cy="3433929"/>
             </a:xfrm>
             <a:prstGeom prst="rect">
               <a:avLst/>
@@ -3415,10 +3559,10 @@
         </p:pic>
         <p:pic>
           <p:nvPicPr>
-            <p:cNvPr id="11" name="图片 10">
+            <p:cNvPr id="10" name="图片 9">
               <a:extLst>
                 <a:ext uri="{FF2B5EF4-FFF2-40B4-BE49-F238E27FC236}">
-                  <a16:creationId xmlns:a16="http://schemas.microsoft.com/office/drawing/2014/main" id="{85BF5928-03DD-B8FE-F8FD-D4FB22A297EF}"/>
+                  <a16:creationId xmlns:a16="http://schemas.microsoft.com/office/drawing/2014/main" id="{BE0FF853-41D6-5936-D6FA-9491ABB591B0}"/>
                 </a:ext>
               </a:extLst>
             </p:cNvPr>
@@ -3441,8 +3585,8 @@
           </p:blipFill>
           <p:spPr>
             <a:xfrm>
-              <a:off x="6017156" y="3305518"/>
-              <a:ext cx="4231632" cy="3552481"/>
+              <a:off x="2943319" y="-4929"/>
+              <a:ext cx="6844302" cy="3429000"/>
             </a:xfrm>
             <a:prstGeom prst="rect">
               <a:avLst/>
@@ -3453,7 +3597,7 @@
     </p:spTree>
     <p:extLst>
       <p:ext uri="{BB962C8B-B14F-4D97-AF65-F5344CB8AC3E}">
-        <p14:creationId xmlns:p14="http://schemas.microsoft.com/office/powerpoint/2010/main" val="512396915"/>
+        <p14:creationId xmlns:p14="http://schemas.microsoft.com/office/powerpoint/2010/main" val="3613118526"/>
       </p:ext>
     </p:extLst>
   </p:cSld>

</xml_diff>

<commit_message>
done!, except multi step
</commit_message>
<xml_diff>
--- a/新建 Microsoft PowerPoint 演示文稿.pptx
+++ b/新建 Microsoft PowerPoint 演示文稿.pptx
@@ -3467,10 +3467,10 @@
       </p:grpSpPr>
       <p:grpSp>
         <p:nvGrpSpPr>
-          <p:cNvPr id="12" name="组合 11">
-            <a:extLst>
-              <a:ext uri="{FF2B5EF4-FFF2-40B4-BE49-F238E27FC236}">
-                <a16:creationId xmlns:a16="http://schemas.microsoft.com/office/drawing/2014/main" id="{A9F33062-EE1C-43E8-3282-BB9A3113CA80}"/>
+          <p:cNvPr id="8" name="组合 7">
+            <a:extLst>
+              <a:ext uri="{FF2B5EF4-FFF2-40B4-BE49-F238E27FC236}">
+                <a16:creationId xmlns:a16="http://schemas.microsoft.com/office/drawing/2014/main" id="{65DA6AF7-BE06-658A-F5C2-EDBD03972990}"/>
               </a:ext>
             </a:extLst>
           </p:cNvPr>
@@ -3479,90 +3479,111 @@
         </p:nvGrpSpPr>
         <p:grpSpPr>
           <a:xfrm>
-            <a:off x="2804613" y="-4929"/>
-            <a:ext cx="7444175" cy="6862928"/>
-            <a:chOff x="2804613" y="-4929"/>
-            <a:chExt cx="7444175" cy="6862928"/>
+            <a:off x="2804613" y="-1"/>
+            <a:ext cx="7444175" cy="6858000"/>
+            <a:chOff x="2804613" y="-1"/>
+            <a:chExt cx="7444175" cy="6858000"/>
           </a:xfrm>
         </p:grpSpPr>
-        <p:pic>
-          <p:nvPicPr>
-            <p:cNvPr id="11" name="图片 10">
+        <p:grpSp>
+          <p:nvGrpSpPr>
+            <p:cNvPr id="12" name="组合 11">
               <a:extLst>
                 <a:ext uri="{FF2B5EF4-FFF2-40B4-BE49-F238E27FC236}">
-                  <a16:creationId xmlns:a16="http://schemas.microsoft.com/office/drawing/2014/main" id="{85BF5928-03DD-B8FE-F8FD-D4FB22A297EF}"/>
+                  <a16:creationId xmlns:a16="http://schemas.microsoft.com/office/drawing/2014/main" id="{A9F33062-EE1C-43E8-3282-BB9A3113CA80}"/>
                 </a:ext>
               </a:extLst>
             </p:cNvPr>
-            <p:cNvPicPr>
-              <a:picLocks noChangeAspect="1"/>
-            </p:cNvPicPr>
+            <p:cNvGrpSpPr/>
             <p:nvPr/>
-          </p:nvPicPr>
-          <p:blipFill>
-            <a:blip r:embed="rId2">
-              <a:extLst>
-                <a:ext uri="{28A0092B-C50C-407E-A947-70E740481C1C}">
-                  <a14:useLocalDpi xmlns:a14="http://schemas.microsoft.com/office/drawing/2010/main" val="0"/>
-                </a:ext>
-              </a:extLst>
-            </a:blip>
-            <a:stretch>
-              <a:fillRect/>
-            </a:stretch>
-          </p:blipFill>
-          <p:spPr>
+          </p:nvGrpSpPr>
+          <p:grpSpPr>
             <a:xfrm>
-              <a:off x="6017156" y="3305518"/>
-              <a:ext cx="4231632" cy="3552481"/>
+              <a:off x="2804613" y="3288988"/>
+              <a:ext cx="7444175" cy="3569011"/>
+              <a:chOff x="2804613" y="3288988"/>
+              <a:chExt cx="7444175" cy="3569011"/>
             </a:xfrm>
-            <a:prstGeom prst="rect">
-              <a:avLst/>
-            </a:prstGeom>
-          </p:spPr>
-        </p:pic>
+          </p:grpSpPr>
+          <p:pic>
+            <p:nvPicPr>
+              <p:cNvPr id="11" name="图片 10">
+                <a:extLst>
+                  <a:ext uri="{FF2B5EF4-FFF2-40B4-BE49-F238E27FC236}">
+                    <a16:creationId xmlns:a16="http://schemas.microsoft.com/office/drawing/2014/main" id="{85BF5928-03DD-B8FE-F8FD-D4FB22A297EF}"/>
+                  </a:ext>
+                </a:extLst>
+              </p:cNvPr>
+              <p:cNvPicPr>
+                <a:picLocks noChangeAspect="1"/>
+              </p:cNvPicPr>
+              <p:nvPr/>
+            </p:nvPicPr>
+            <p:blipFill>
+              <a:blip r:embed="rId2">
+                <a:extLst>
+                  <a:ext uri="{28A0092B-C50C-407E-A947-70E740481C1C}">
+                    <a14:useLocalDpi xmlns:a14="http://schemas.microsoft.com/office/drawing/2010/main" val="0"/>
+                  </a:ext>
+                </a:extLst>
+              </a:blip>
+              <a:stretch>
+                <a:fillRect/>
+              </a:stretch>
+            </p:blipFill>
+            <p:spPr>
+              <a:xfrm>
+                <a:off x="6017156" y="3305518"/>
+                <a:ext cx="4231632" cy="3552481"/>
+              </a:xfrm>
+              <a:prstGeom prst="rect">
+                <a:avLst/>
+              </a:prstGeom>
+            </p:spPr>
+          </p:pic>
+          <p:pic>
+            <p:nvPicPr>
+              <p:cNvPr id="6" name="图片 5">
+                <a:extLst>
+                  <a:ext uri="{FF2B5EF4-FFF2-40B4-BE49-F238E27FC236}">
+                    <a16:creationId xmlns:a16="http://schemas.microsoft.com/office/drawing/2014/main" id="{57EB3650-1F74-4D4C-F0D9-192AF736BA58}"/>
+                  </a:ext>
+                </a:extLst>
+              </p:cNvPr>
+              <p:cNvPicPr>
+                <a:picLocks noChangeAspect="1"/>
+              </p:cNvPicPr>
+              <p:nvPr/>
+            </p:nvPicPr>
+            <p:blipFill>
+              <a:blip r:embed="rId3">
+                <a:extLst>
+                  <a:ext uri="{28A0092B-C50C-407E-A947-70E740481C1C}">
+                    <a14:useLocalDpi xmlns:a14="http://schemas.microsoft.com/office/drawing/2010/main" val="0"/>
+                  </a:ext>
+                </a:extLst>
+              </a:blip>
+              <a:stretch>
+                <a:fillRect/>
+              </a:stretch>
+            </p:blipFill>
+            <p:spPr>
+              <a:xfrm>
+                <a:off x="2804613" y="3288988"/>
+                <a:ext cx="3415009" cy="3433929"/>
+              </a:xfrm>
+              <a:prstGeom prst="rect">
+                <a:avLst/>
+              </a:prstGeom>
+            </p:spPr>
+          </p:pic>
+        </p:grpSp>
         <p:pic>
           <p:nvPicPr>
-            <p:cNvPr id="6" name="图片 5">
+            <p:cNvPr id="7" name="图片 6">
               <a:extLst>
                 <a:ext uri="{FF2B5EF4-FFF2-40B4-BE49-F238E27FC236}">
-                  <a16:creationId xmlns:a16="http://schemas.microsoft.com/office/drawing/2014/main" id="{57EB3650-1F74-4D4C-F0D9-192AF736BA58}"/>
-                </a:ext>
-              </a:extLst>
-            </p:cNvPr>
-            <p:cNvPicPr>
-              <a:picLocks noChangeAspect="1"/>
-            </p:cNvPicPr>
-            <p:nvPr/>
-          </p:nvPicPr>
-          <p:blipFill>
-            <a:blip r:embed="rId3">
-              <a:extLst>
-                <a:ext uri="{28A0092B-C50C-407E-A947-70E740481C1C}">
-                  <a14:useLocalDpi xmlns:a14="http://schemas.microsoft.com/office/drawing/2010/main" val="0"/>
-                </a:ext>
-              </a:extLst>
-            </a:blip>
-            <a:stretch>
-              <a:fillRect/>
-            </a:stretch>
-          </p:blipFill>
-          <p:spPr>
-            <a:xfrm>
-              <a:off x="2804613" y="3288988"/>
-              <a:ext cx="3415009" cy="3433929"/>
-            </a:xfrm>
-            <a:prstGeom prst="rect">
-              <a:avLst/>
-            </a:prstGeom>
-          </p:spPr>
-        </p:pic>
-        <p:pic>
-          <p:nvPicPr>
-            <p:cNvPr id="10" name="图片 9">
-              <a:extLst>
-                <a:ext uri="{FF2B5EF4-FFF2-40B4-BE49-F238E27FC236}">
-                  <a16:creationId xmlns:a16="http://schemas.microsoft.com/office/drawing/2014/main" id="{BE0FF853-41D6-5936-D6FA-9491ABB591B0}"/>
+                  <a16:creationId xmlns:a16="http://schemas.microsoft.com/office/drawing/2014/main" id="{106B9DFF-D6DE-9451-D8A8-B5E6632C6E46}"/>
                 </a:ext>
               </a:extLst>
             </p:cNvPr>
@@ -3585,8 +3606,8 @@
           </p:blipFill>
           <p:spPr>
             <a:xfrm>
-              <a:off x="2943319" y="-4929"/>
-              <a:ext cx="6844302" cy="3429000"/>
+              <a:off x="2909691" y="-1"/>
+              <a:ext cx="6743464" cy="3367237"/>
             </a:xfrm>
             <a:prstGeom prst="rect">
               <a:avLst/>

</xml_diff>